<commit_message>
fixed errors, made done readme.md
</commit_message>
<xml_diff>
--- a/included/JejuMatjipProject.pptx
+++ b/included/JejuMatjipProject.pptx
@@ -3735,6 +3735,13 @@
   <p:clrMapOvr>
     <a:masterClrMapping/>
   </p:clrMapOvr>
+  <p:timing>
+    <p:tnLst>
+      <p:par>
+        <p:cTn id="1" dur="indefinite" restart="never" nodeType="tmRoot"/>
+      </p:par>
+    </p:tnLst>
+  </p:timing>
 </p:sld>
 </file>
 
@@ -4410,6 +4417,13 @@
   <p:clrMapOvr>
     <a:masterClrMapping/>
   </p:clrMapOvr>
+  <p:timing>
+    <p:tnLst>
+      <p:par>
+        <p:cTn id="1" dur="indefinite" restart="never" nodeType="tmRoot"/>
+      </p:par>
+    </p:tnLst>
+  </p:timing>
 </p:sld>
 </file>
 
@@ -5428,19 +5442,7 @@
                           <a:cs typeface="Anaheim"/>
                           <a:sym typeface="Anaheim"/>
                         </a:rPr>
-                        <a:t>맛집 </a:t>
-                      </a:r>
-                      <a:r>
-                        <a:rPr lang="ko-KR" altLang="en-US" sz="1400" dirty="0" smtClean="0">
-                          <a:solidFill>
-                            <a:schemeClr val="dk2"/>
-                          </a:solidFill>
-                          <a:latin typeface="에스코어 드림 5 Medium" panose="020B0503030302020204" pitchFamily="34" charset="-127"/>
-                          <a:ea typeface="에스코어 드림 5 Medium" panose="020B0503030302020204" pitchFamily="34" charset="-127"/>
-                          <a:cs typeface="Anaheim"/>
-                          <a:sym typeface="Anaheim"/>
-                        </a:rPr>
-                        <a:t>리스트 보기 </a:t>
+                        <a:t>맛집 리스트 보기 </a:t>
                       </a:r>
                       <a:r>
                         <a:rPr lang="en-US" altLang="ko-KR" sz="1400" dirty="0" smtClean="0">
@@ -5454,15 +5456,6 @@
                         </a:rPr>
                         <a:t>/ </a:t>
                       </a:r>
-                      <a:endParaRPr lang="en-US" altLang="ko-KR" sz="1400" dirty="0" smtClean="0">
-                        <a:solidFill>
-                          <a:schemeClr val="dk2"/>
-                        </a:solidFill>
-                        <a:latin typeface="에스코어 드림 5 Medium" panose="020B0503030302020204" pitchFamily="34" charset="-127"/>
-                        <a:ea typeface="에스코어 드림 5 Medium" panose="020B0503030302020204" pitchFamily="34" charset="-127"/>
-                        <a:cs typeface="Anaheim"/>
-                        <a:sym typeface="Anaheim"/>
-                      </a:endParaRPr>
                     </a:p>
                     <a:p>
                       <a:pPr marL="0" marR="0" lvl="0" indent="0" algn="ctr" defTabSz="914400" rtl="0" eaLnBrk="1" fontAlgn="auto" latinLnBrk="1" hangingPunct="1">
@@ -6336,6 +6329,13 @@
   <p:clrMapOvr>
     <a:masterClrMapping/>
   </p:clrMapOvr>
+  <p:timing>
+    <p:tnLst>
+      <p:par>
+        <p:cTn id="1" dur="indefinite" restart="never" nodeType="tmRoot"/>
+      </p:par>
+    </p:tnLst>
+  </p:timing>
 </p:sld>
 </file>
 
@@ -6646,99 +6646,36 @@
           </p:pic>
         </p:grpSp>
       </p:grpSp>
-      <p:grpSp>
-        <p:nvGrpSpPr>
-          <p:cNvPr id="3" name="그룹 2"/>
-          <p:cNvGrpSpPr/>
+      <p:pic>
+        <p:nvPicPr>
+          <p:cNvPr id="4" name="그림 3"/>
+          <p:cNvPicPr>
+            <a:picLocks noChangeAspect="1"/>
+          </p:cNvPicPr>
           <p:nvPr/>
-        </p:nvGrpSpPr>
-        <p:grpSpPr>
+        </p:nvPicPr>
+        <p:blipFill>
+          <a:blip r:embed="rId3">
+            <a:extLst>
+              <a:ext uri="{28A0092B-C50C-407E-A947-70E740481C1C}">
+                <a14:useLocalDpi xmlns:a14="http://schemas.microsoft.com/office/drawing/2010/main" val="0"/>
+              </a:ext>
+            </a:extLst>
+          </a:blip>
+          <a:stretch>
+            <a:fillRect/>
+          </a:stretch>
+        </p:blipFill>
+        <p:spPr>
           <a:xfrm>
-            <a:off x="2200237" y="1962150"/>
-            <a:ext cx="7791526" cy="3985955"/>
-            <a:chOff x="2574442" y="2836221"/>
-            <a:chExt cx="6008464" cy="3073784"/>
+            <a:off x="3864556" y="1421931"/>
+            <a:ext cx="4462887" cy="4754406"/>
           </a:xfrm>
-        </p:grpSpPr>
-        <p:pic>
-          <p:nvPicPr>
-            <p:cNvPr id="12" name="그림 11"/>
-            <p:cNvPicPr>
-              <a:picLocks noChangeAspect="1"/>
-            </p:cNvPicPr>
-            <p:nvPr/>
-          </p:nvPicPr>
-          <p:blipFill>
-            <a:blip r:embed="rId3">
-              <a:extLst>
-                <a:ext uri="{28A0092B-C50C-407E-A947-70E740481C1C}">
-                  <a14:useLocalDpi xmlns:a14="http://schemas.microsoft.com/office/drawing/2010/main" val="0"/>
-                </a:ext>
-              </a:extLst>
-            </a:blip>
-            <a:stretch>
-              <a:fillRect/>
-            </a:stretch>
-          </p:blipFill>
-          <p:spPr>
-            <a:xfrm>
-              <a:off x="2574442" y="2836221"/>
-              <a:ext cx="6008464" cy="3073784"/>
-            </a:xfrm>
-            <a:prstGeom prst="rect">
-              <a:avLst/>
-            </a:prstGeom>
-          </p:spPr>
-        </p:pic>
-        <p:sp>
-          <p:nvSpPr>
-            <p:cNvPr id="2" name="직사각형 1"/>
-            <p:cNvSpPr/>
-            <p:nvPr/>
-          </p:nvSpPr>
-          <p:spPr>
-            <a:xfrm>
-              <a:off x="3742912" y="3304927"/>
-              <a:ext cx="3671524" cy="2136371"/>
-            </a:xfrm>
-            <a:prstGeom prst="rect">
-              <a:avLst/>
-            </a:prstGeom>
-          </p:spPr>
-          <p:style>
-            <a:lnRef idx="2">
-              <a:schemeClr val="accent1">
-                <a:shade val="50000"/>
-              </a:schemeClr>
-            </a:lnRef>
-            <a:fillRef idx="1">
-              <a:schemeClr val="accent1"/>
-            </a:fillRef>
-            <a:effectRef idx="0">
-              <a:schemeClr val="accent1"/>
-            </a:effectRef>
-            <a:fontRef idx="minor">
-              <a:schemeClr val="lt1"/>
-            </a:fontRef>
-          </p:style>
-          <p:txBody>
-            <a:bodyPr rtlCol="0" anchor="ctr"/>
-            <a:lstStyle/>
-            <a:p>
-              <a:pPr algn="ctr"/>
-              <a:r>
-                <a:rPr lang="en-US" altLang="ko-KR" dirty="0" smtClean="0"/>
-                <a:t>Readme. </a:t>
-              </a:r>
-              <a:r>
-                <a:rPr lang="ko-KR" altLang="en-US" dirty="0" smtClean="0"/>
-                <a:t>캡쳐 후 대체 요망</a:t>
-              </a:r>
-              <a:endParaRPr lang="ko-KR" altLang="en-US" dirty="0"/>
-            </a:p>
-          </p:txBody>
-        </p:sp>
-      </p:grpSp>
+          <a:prstGeom prst="rect">
+            <a:avLst/>
+          </a:prstGeom>
+        </p:spPr>
+      </p:pic>
     </p:spTree>
     <p:extLst>
       <p:ext uri="{BB962C8B-B14F-4D97-AF65-F5344CB8AC3E}">
@@ -6749,6 +6686,13 @@
   <p:clrMapOvr>
     <a:masterClrMapping/>
   </p:clrMapOvr>
+  <p:timing>
+    <p:tnLst>
+      <p:par>
+        <p:cTn id="1" dur="indefinite" restart="never" nodeType="tmRoot"/>
+      </p:par>
+    </p:tnLst>
+  </p:timing>
 </p:sld>
 </file>
 
@@ -7056,50 +7000,35 @@
           </p:pic>
         </p:grpSp>
       </p:grpSp>
-      <p:sp>
-        <p:nvSpPr>
-          <p:cNvPr id="11" name="직사각형 10"/>
-          <p:cNvSpPr/>
+      <p:pic>
+        <p:nvPicPr>
+          <p:cNvPr id="2" name="그림 1"/>
+          <p:cNvPicPr>
+            <a:picLocks noChangeAspect="1"/>
+          </p:cNvPicPr>
           <p:nvPr/>
-        </p:nvSpPr>
+        </p:nvPicPr>
+        <p:blipFill rotWithShape="1">
+          <a:blip r:embed="rId3">
+            <a:extLst>
+              <a:ext uri="{28A0092B-C50C-407E-A947-70E740481C1C}">
+                <a14:useLocalDpi xmlns:a14="http://schemas.microsoft.com/office/drawing/2010/main" val="0"/>
+              </a:ext>
+            </a:extLst>
+          </a:blip>
+          <a:srcRect r="441" b="1316"/>
+          <a:stretch/>
+        </p:blipFill>
         <p:spPr>
           <a:xfrm>
-            <a:off x="3715460" y="2569948"/>
-            <a:ext cx="4761079" cy="2770357"/>
+            <a:off x="1083425" y="1918270"/>
+            <a:ext cx="10014065" cy="3759323"/>
           </a:xfrm>
           <a:prstGeom prst="rect">
             <a:avLst/>
           </a:prstGeom>
         </p:spPr>
-        <p:style>
-          <a:lnRef idx="2">
-            <a:schemeClr val="accent1">
-              <a:shade val="50000"/>
-            </a:schemeClr>
-          </a:lnRef>
-          <a:fillRef idx="1">
-            <a:schemeClr val="accent1"/>
-          </a:fillRef>
-          <a:effectRef idx="0">
-            <a:schemeClr val="accent1"/>
-          </a:effectRef>
-          <a:fontRef idx="minor">
-            <a:schemeClr val="lt1"/>
-          </a:fontRef>
-        </p:style>
-        <p:txBody>
-          <a:bodyPr rtlCol="0" anchor="ctr"/>
-          <a:lstStyle/>
-          <a:p>
-            <a:pPr algn="ctr"/>
-            <a:r>
-              <a:rPr lang="ko-KR" altLang="en-US" dirty="0" smtClean="0"/>
-              <a:t>주요 기능 부분 캡쳐 또는 서술</a:t>
-            </a:r>
-            <a:endParaRPr lang="ko-KR" altLang="en-US" dirty="0"/>
-          </a:p>
-        </p:txBody>
-      </p:sp>
+      </p:pic>
     </p:spTree>
     <p:extLst>
       <p:ext uri="{BB962C8B-B14F-4D97-AF65-F5344CB8AC3E}">
@@ -7110,6 +7039,13 @@
   <p:clrMapOvr>
     <a:masterClrMapping/>
   </p:clrMapOvr>
+  <p:timing>
+    <p:tnLst>
+      <p:par>
+        <p:cTn id="1" dur="indefinite" restart="never" nodeType="tmRoot"/>
+      </p:par>
+    </p:tnLst>
+  </p:timing>
 </p:sld>
 </file>
 
@@ -7219,6 +7155,13 @@
   <p:clrMapOvr>
     <a:masterClrMapping/>
   </p:clrMapOvr>
+  <p:timing>
+    <p:tnLst>
+      <p:par>
+        <p:cTn id="1" dur="indefinite" restart="never" nodeType="tmRoot"/>
+      </p:par>
+    </p:tnLst>
+  </p:timing>
 </p:sld>
 </file>
 

</xml_diff>